<commit_message>
v02 of draft. Updated based on comments on list and at IETF 87.
</commit_message>
<xml_diff>
--- a/rib-info-model-ietf87.pptx
+++ b/rib-info-model-ietf87.pptx
@@ -207,7 +207,7 @@
           <a:p>
             <a:fld id="{2E345584-E883-7C4E-BB77-BED7D284FD40}" type="datetimeFigureOut">
               <a:rPr lang="en-US" smtClean="0"/>
-              <a:t>8/1/13</a:t>
+              <a:t>8/14/13</a:t>
             </a:fld>
             <a:endParaRPr lang="en-US"/>
           </a:p>
@@ -373,7 +373,7 @@
           <a:p>
             <a:fld id="{261C745D-2099-9142-8B31-59C52CCC8A9E}" type="datetimeFigureOut">
               <a:rPr lang="en-US" smtClean="0"/>
-              <a:t>8/1/13</a:t>
+              <a:t>8/14/13</a:t>
             </a:fld>
             <a:endParaRPr lang="en-US"/>
           </a:p>
@@ -1110,7 +1110,7 @@
           <a:p>
             <a:fld id="{3C1D75F7-EE41-9149-AA5C-515B6C8D511E}" type="datetime1">
               <a:rPr lang="en-US" smtClean="0"/>
-              <a:t>8/1/13</a:t>
+              <a:t>8/14/13</a:t>
             </a:fld>
             <a:endParaRPr lang="en-US"/>
           </a:p>
@@ -1275,7 +1275,7 @@
           <a:p>
             <a:fld id="{308D9980-392B-5A49-9DBF-E8B66A9932CD}" type="datetime1">
               <a:rPr lang="en-US" smtClean="0"/>
-              <a:t>8/1/13</a:t>
+              <a:t>8/14/13</a:t>
             </a:fld>
             <a:endParaRPr lang="en-US"/>
           </a:p>
@@ -1450,7 +1450,7 @@
           <a:p>
             <a:fld id="{7BE12901-3037-C34A-9675-0553EC83F0E7}" type="datetime1">
               <a:rPr lang="en-US" smtClean="0"/>
-              <a:t>8/1/13</a:t>
+              <a:t>8/14/13</a:t>
             </a:fld>
             <a:endParaRPr lang="en-US"/>
           </a:p>
@@ -1615,7 +1615,7 @@
           <a:p>
             <a:fld id="{BD44F659-4F06-624A-BE0C-0BC8CB2E73F2}" type="datetime1">
               <a:rPr lang="en-US" smtClean="0"/>
-              <a:t>8/1/13</a:t>
+              <a:t>8/14/13</a:t>
             </a:fld>
             <a:endParaRPr lang="en-US"/>
           </a:p>
@@ -2168,7 +2168,7 @@
           <a:p>
             <a:fld id="{0B5508E5-E1B9-7743-96F6-FA9EE17A3F17}" type="datetime1">
               <a:rPr lang="en-US" smtClean="0"/>
-              <a:t>8/1/13</a:t>
+              <a:t>8/14/13</a:t>
             </a:fld>
             <a:endParaRPr lang="en-US"/>
           </a:p>
@@ -2428,7 +2428,7 @@
           <a:p>
             <a:fld id="{0126F583-434B-EE42-A998-873176520211}" type="datetime1">
               <a:rPr lang="en-US" smtClean="0"/>
-              <a:t>8/1/13</a:t>
+              <a:t>8/14/13</a:t>
             </a:fld>
             <a:endParaRPr lang="en-US"/>
           </a:p>
@@ -2916,7 +2916,7 @@
           <a:p>
             <a:fld id="{EBB46C16-ACC3-4E48-91AE-F5109622FB61}" type="datetime1">
               <a:rPr lang="en-US" smtClean="0"/>
-              <a:t>8/1/13</a:t>
+              <a:t>8/14/13</a:t>
             </a:fld>
             <a:endParaRPr lang="en-US"/>
           </a:p>
@@ -3029,7 +3029,7 @@
           <a:p>
             <a:fld id="{67A391EF-FFA2-FD4D-8E32-BAAA35DC13D7}" type="datetime1">
               <a:rPr lang="en-US" smtClean="0"/>
-              <a:t>8/1/13</a:t>
+              <a:t>8/14/13</a:t>
             </a:fld>
             <a:endParaRPr lang="en-US"/>
           </a:p>
@@ -3119,7 +3119,7 @@
           <a:p>
             <a:fld id="{FF2E09B7-8693-D949-BEA9-BBA4CF0A804E}" type="datetime1">
               <a:rPr lang="en-US" smtClean="0"/>
-              <a:t>8/1/13</a:t>
+              <a:t>8/14/13</a:t>
             </a:fld>
             <a:endParaRPr lang="en-US"/>
           </a:p>
@@ -3549,7 +3549,7 @@
           <a:p>
             <a:fld id="{E9521C3D-6EEC-B64A-82F4-D9CB250A6513}" type="datetime1">
               <a:rPr lang="en-US" smtClean="0"/>
-              <a:t>8/1/13</a:t>
+              <a:t>8/14/13</a:t>
             </a:fld>
             <a:endParaRPr lang="en-US"/>
           </a:p>
@@ -4082,7 +4082,7 @@
           <a:p>
             <a:fld id="{C500E188-1147-6A42-9E16-3254CC8D4F86}" type="datetime1">
               <a:rPr lang="en-US" smtClean="0"/>
-              <a:t>8/1/13</a:t>
+              <a:t>8/14/13</a:t>
             </a:fld>
             <a:endParaRPr lang="en-US"/>
           </a:p>
@@ -4922,7 +4922,7 @@
           <a:p>
             <a:fld id="{73E8EDFB-9683-774D-BB33-7F569DF16A17}" type="datetime1">
               <a:rPr lang="en-US" smtClean="0"/>
-              <a:t>8/1/13</a:t>
+              <a:t>8/14/13</a:t>
             </a:fld>
             <a:endParaRPr lang="en-US"/>
           </a:p>
@@ -6102,40 +6102,6 @@
           </p:style>
         </p:cxnSp>
       </p:grpSp>
-      <p:sp>
-        <p:nvSpPr>
-          <p:cNvPr id="26" name="TextBox 25"/>
-          <p:cNvSpPr txBox="1"/>
-          <p:nvPr/>
-        </p:nvSpPr>
-        <p:spPr>
-          <a:xfrm>
-            <a:off x="1621700" y="3267476"/>
-            <a:ext cx="708780" cy="369332"/>
-          </a:xfrm>
-          <a:prstGeom prst="rect">
-            <a:avLst/>
-          </a:prstGeom>
-          <a:noFill/>
-        </p:spPr>
-        <p:txBody>
-          <a:bodyPr wrap="square" rtlCol="0">
-            <a:spAutoFit/>
-          </a:bodyPr>
-          <a:lstStyle/>
-          <a:p>
-            <a:r>
-              <a:rPr lang="en-US" dirty="0"/>
-              <a:t>1</a:t>
-            </a:r>
-            <a:r>
-              <a:rPr lang="en-US" dirty="0" smtClean="0"/>
-              <a:t>..N</a:t>
-            </a:r>
-            <a:endParaRPr lang="en-US" dirty="0"/>
-          </a:p>
-        </p:txBody>
-      </p:sp>
       <p:grpSp>
         <p:nvGrpSpPr>
           <p:cNvPr id="28" name="Group 27"/>
@@ -6842,33 +6808,6 @@
                                   </p:childTnLst>
                                 </p:cTn>
                               </p:par>
-                              <p:par>
-                                <p:cTn id="7" presetID="1" presetClass="entr" presetSubtype="0" fill="hold" grpId="0" nodeType="withEffect">
-                                  <p:stCondLst>
-                                    <p:cond delay="0"/>
-                                  </p:stCondLst>
-                                  <p:childTnLst>
-                                    <p:set>
-                                      <p:cBhvr>
-                                        <p:cTn id="8" dur="1" fill="hold">
-                                          <p:stCondLst>
-                                            <p:cond delay="0"/>
-                                          </p:stCondLst>
-                                        </p:cTn>
-                                        <p:tgtEl>
-                                          <p:spTgt spid="26"/>
-                                        </p:tgtEl>
-                                        <p:attrNameLst>
-                                          <p:attrName>style.visibility</p:attrName>
-                                        </p:attrNameLst>
-                                      </p:cBhvr>
-                                      <p:to>
-                                        <p:strVal val="visible"/>
-                                      </p:to>
-                                    </p:set>
-                                  </p:childTnLst>
-                                </p:cTn>
-                              </p:par>
                             </p:childTnLst>
                           </p:cTn>
                         </p:par>
@@ -6876,26 +6815,26 @@
                     </p:cTn>
                   </p:par>
                   <p:par>
-                    <p:cTn id="9" fill="hold">
+                    <p:cTn id="7" fill="hold">
                       <p:stCondLst>
                         <p:cond delay="indefinite"/>
                       </p:stCondLst>
                       <p:childTnLst>
                         <p:par>
-                          <p:cTn id="10" fill="hold">
+                          <p:cTn id="8" fill="hold">
                             <p:stCondLst>
                               <p:cond delay="0"/>
                             </p:stCondLst>
                             <p:childTnLst>
                               <p:par>
-                                <p:cTn id="11" presetID="1" presetClass="entr" presetSubtype="0" fill="hold" nodeType="clickEffect">
+                                <p:cTn id="9" presetID="1" presetClass="entr" presetSubtype="0" fill="hold" nodeType="clickEffect">
                                   <p:stCondLst>
                                     <p:cond delay="0"/>
                                   </p:stCondLst>
                                   <p:childTnLst>
                                     <p:set>
                                       <p:cBhvr>
-                                        <p:cTn id="12" dur="1" fill="hold">
+                                        <p:cTn id="10" dur="1" fill="hold">
                                           <p:stCondLst>
                                             <p:cond delay="0"/>
                                           </p:stCondLst>
@@ -6915,7 +6854,34 @@
                                 </p:cTn>
                               </p:par>
                               <p:par>
-                                <p:cTn id="13" presetID="1" presetClass="entr" presetSubtype="0" fill="hold" grpId="1" nodeType="withEffect">
+                                <p:cTn id="11" presetID="1" presetClass="entr" presetSubtype="0" fill="hold" grpId="1" nodeType="withEffect">
+                                  <p:stCondLst>
+                                    <p:cond delay="0"/>
+                                  </p:stCondLst>
+                                  <p:childTnLst>
+                                    <p:set>
+                                      <p:cBhvr>
+                                        <p:cTn id="12" dur="1" fill="hold">
+                                          <p:stCondLst>
+                                            <p:cond delay="0"/>
+                                          </p:stCondLst>
+                                        </p:cTn>
+                                        <p:tgtEl>
+                                          <p:spTgt spid="48"/>
+                                        </p:tgtEl>
+                                        <p:attrNameLst>
+                                          <p:attrName>style.visibility</p:attrName>
+                                        </p:attrNameLst>
+                                      </p:cBhvr>
+                                      <p:to>
+                                        <p:strVal val="visible"/>
+                                      </p:to>
+                                    </p:set>
+                                  </p:childTnLst>
+                                </p:cTn>
+                              </p:par>
+                              <p:par>
+                                <p:cTn id="13" presetID="1" presetClass="entr" presetSubtype="0" fill="hold" grpId="0" nodeType="withEffect">
                                   <p:stCondLst>
                                     <p:cond delay="0"/>
                                   </p:stCondLst>
@@ -6941,33 +6907,6 @@
                                   </p:childTnLst>
                                 </p:cTn>
                               </p:par>
-                              <p:par>
-                                <p:cTn id="15" presetID="1" presetClass="entr" presetSubtype="0" fill="hold" grpId="0" nodeType="withEffect">
-                                  <p:stCondLst>
-                                    <p:cond delay="0"/>
-                                  </p:stCondLst>
-                                  <p:childTnLst>
-                                    <p:set>
-                                      <p:cBhvr>
-                                        <p:cTn id="16" dur="1" fill="hold">
-                                          <p:stCondLst>
-                                            <p:cond delay="0"/>
-                                          </p:stCondLst>
-                                        </p:cTn>
-                                        <p:tgtEl>
-                                          <p:spTgt spid="48"/>
-                                        </p:tgtEl>
-                                        <p:attrNameLst>
-                                          <p:attrName>style.visibility</p:attrName>
-                                        </p:attrNameLst>
-                                      </p:cBhvr>
-                                      <p:to>
-                                        <p:strVal val="visible"/>
-                                      </p:to>
-                                    </p:set>
-                                  </p:childTnLst>
-                                </p:cTn>
-                              </p:par>
                             </p:childTnLst>
                           </p:cTn>
                         </p:par>
@@ -6975,26 +6914,26 @@
                     </p:cTn>
                   </p:par>
                   <p:par>
-                    <p:cTn id="17" fill="hold">
+                    <p:cTn id="15" fill="hold">
                       <p:stCondLst>
                         <p:cond delay="indefinite"/>
                       </p:stCondLst>
                       <p:childTnLst>
                         <p:par>
-                          <p:cTn id="18" fill="hold">
+                          <p:cTn id="16" fill="hold">
                             <p:stCondLst>
                               <p:cond delay="0"/>
                             </p:stCondLst>
                             <p:childTnLst>
                               <p:par>
-                                <p:cTn id="19" presetID="1" presetClass="entr" presetSubtype="0" fill="hold" nodeType="clickEffect">
+                                <p:cTn id="17" presetID="1" presetClass="entr" presetSubtype="0" fill="hold" nodeType="clickEffect">
                                   <p:stCondLst>
                                     <p:cond delay="0"/>
                                   </p:stCondLst>
                                   <p:childTnLst>
                                     <p:set>
                                       <p:cBhvr>
-                                        <p:cTn id="20" dur="1" fill="hold">
+                                        <p:cTn id="18" dur="1" fill="hold">
                                           <p:stCondLst>
                                             <p:cond delay="0"/>
                                           </p:stCondLst>
@@ -7041,7 +6980,6 @@
       </p:par>
     </p:tnLst>
     <p:bldLst>
-      <p:bldP spid="26" grpId="0"/>
       <p:bldP spid="48" grpId="0"/>
       <p:bldP spid="48" grpId="1"/>
     </p:bldLst>
@@ -8602,17 +8540,7 @@
                 <a:latin typeface="Arial"/>
                 <a:cs typeface="Arial"/>
               </a:rPr>
-              <a:t>RIB and </a:t>
-            </a:r>
-            <a:r>
-              <a:rPr lang="en-US" dirty="0" smtClean="0">
-                <a:solidFill>
-                  <a:srgbClr val="292929"/>
-                </a:solidFill>
-                <a:latin typeface="Arial"/>
-                <a:cs typeface="Arial"/>
-              </a:rPr>
-              <a:t>other higher level abstractions that allow one to make sense of the routes</a:t>
+              <a:t>RIB and other higher level abstractions that allow one to make sense of the routes</a:t>
             </a:r>
           </a:p>
         </p:txBody>
@@ -10647,7 +10575,7 @@
           </p:nvSpPr>
           <p:spPr>
             <a:xfrm>
-              <a:off x="4858096" y="2372965"/>
+              <a:off x="6615280" y="2322129"/>
               <a:ext cx="708780" cy="369332"/>
             </a:xfrm>
             <a:prstGeom prst="rect">

</xml_diff>